<commit_message>
Review 1st day presentations
</commit_message>
<xml_diff>
--- a/Training/Containers and Docker_MI.pptx
+++ b/Training/Containers and Docker_MI.pptx
@@ -225,7 +225,7 @@
           <a:p>
             <a:fld id="{7CD9D685-713B-4B36-BDBC-36B40074899B}" type="datetimeFigureOut">
               <a:rPr lang="en-US" smtClean="0"/>
-              <a:t>6/21/18</a:t>
+              <a:t>6/24/18</a:t>
             </a:fld>
             <a:endParaRPr lang="en-US" dirty="0"/>
           </a:p>
@@ -45619,15 +45619,15 @@
           <a:lstStyle/>
           <a:p>
             <a:r>
-              <a:rPr lang="en-GB" altLang="en-US" sz="2000" b="1"/>
+              <a:rPr lang="en-GB" altLang="en-US" sz="2000" b="1" dirty="0"/>
               <a:t>Linux Containers (LXC)</a:t>
             </a:r>
             <a:r>
-              <a:rPr lang="en-GB" altLang="en-US" sz="2000"/>
+              <a:rPr lang="en-GB" altLang="en-US" sz="2000" dirty="0"/>
               <a:t> </a:t>
             </a:r>
             <a:r>
-              <a:rPr lang="en-US" sz="2000"/>
+              <a:rPr lang="en-US" sz="2000" dirty="0"/>
               <a:t>details:</a:t>
             </a:r>
           </a:p>
@@ -45637,8 +45637,16 @@
               <a:buChar char="•"/>
             </a:pPr>
             <a:r>
-              <a:rPr lang="en-US" sz="2000"/>
-              <a:t>An isolated user space within a running Linux OS</a:t>
+              <a:rPr lang="en-US" sz="2000" dirty="0"/>
+              <a:t>An isolated </a:t>
+            </a:r>
+            <a:r>
+              <a:rPr lang="en-US" sz="2000" b="1" dirty="0"/>
+              <a:t>user space </a:t>
+            </a:r>
+            <a:r>
+              <a:rPr lang="en-US" sz="2000" dirty="0"/>
+              <a:t>within a running Linux OS</a:t>
             </a:r>
           </a:p>
           <a:p>
@@ -45647,7 +45655,7 @@
               <a:buChar char="•"/>
             </a:pPr>
             <a:r>
-              <a:rPr lang="en-US" sz="2000"/>
+              <a:rPr lang="en-US" sz="2000" dirty="0"/>
               <a:t>Shared kernel across containers</a:t>
             </a:r>
           </a:p>
@@ -45657,8 +45665,12 @@
               <a:buChar char="•"/>
             </a:pPr>
             <a:r>
-              <a:rPr lang="en-US" sz="2000"/>
-              <a:t>Direct device access</a:t>
+              <a:rPr lang="en-US" sz="2000" dirty="0"/>
+              <a:t>Direct </a:t>
+            </a:r>
+            <a:r>
+              <a:rPr lang="en-US" sz="2000" b="1" dirty="0"/>
+              <a:t>device access</a:t>
             </a:r>
           </a:p>
           <a:p>
@@ -45667,7 +45679,7 @@
               <a:buChar char="•"/>
             </a:pPr>
             <a:r>
-              <a:rPr lang="en-US" sz="2000"/>
+              <a:rPr lang="en-US" sz="2000" dirty="0"/>
               <a:t>All packages and data in an isolated runtime, saved as a filesystem</a:t>
             </a:r>
           </a:p>
@@ -45677,8 +45689,16 @@
               <a:buChar char="•"/>
             </a:pPr>
             <a:r>
-              <a:rPr lang="en-US" sz="2000"/>
-              <a:t>Resource management implemented with control groups (cgroups)</a:t>
+              <a:rPr lang="en-US" sz="2000" dirty="0"/>
+              <a:t>Resource management implemented with control groups (</a:t>
+            </a:r>
+            <a:r>
+              <a:rPr lang="en-US" sz="2000" b="1" dirty="0" err="1"/>
+              <a:t>cgroups</a:t>
+            </a:r>
+            <a:r>
+              <a:rPr lang="en-US" sz="2000" dirty="0"/>
+              <a:t>)</a:t>
             </a:r>
           </a:p>
           <a:p>
@@ -45687,8 +45707,12 @@
               <a:buChar char="•"/>
             </a:pPr>
             <a:r>
-              <a:rPr lang="en-US" sz="2000"/>
-              <a:t>Resource isolation through namespaces</a:t>
+              <a:rPr lang="en-US" sz="2000" dirty="0"/>
+              <a:t>Resource isolation through </a:t>
+            </a:r>
+            <a:r>
+              <a:rPr lang="en-US" sz="2000" b="1" dirty="0"/>
+              <a:t>namespaces</a:t>
             </a:r>
           </a:p>
           <a:p>
@@ -56807,7 +56831,11 @@
             </a:pPr>
             <a:r>
               <a:rPr lang="en-US" altLang="en-US" dirty="0"/>
-              <a:t>Can be treated as unchangeable</a:t>
+              <a:t>Can be treated as </a:t>
+            </a:r>
+            <a:r>
+              <a:rPr lang="en-US" altLang="en-US" b="1" dirty="0"/>
+              <a:t>unchangeable</a:t>
             </a:r>
           </a:p>
           <a:p>

</xml_diff>

<commit_message>
Polish Day 1 presentations
</commit_message>
<xml_diff>
--- a/Training/Containers and Docker_MI.pptx
+++ b/Training/Containers and Docker_MI.pptx
@@ -45690,7 +45690,15 @@
             </a:pPr>
             <a:r>
               <a:rPr lang="en-US" sz="2000" dirty="0"/>
-              <a:t>Resource management implemented with control groups (</a:t>
+              <a:t>Resource management </a:t>
+            </a:r>
+            <a:r>
+              <a:rPr lang="en-US" sz="2000" b="1" dirty="0"/>
+              <a:t>implemented</a:t>
+            </a:r>
+            <a:r>
+              <a:rPr lang="en-US" sz="2000" dirty="0"/>
+              <a:t> with control groups (</a:t>
             </a:r>
             <a:r>
               <a:rPr lang="en-US" sz="2000" b="1" dirty="0" err="1"/>
@@ -47683,7 +47691,26 @@
                 <a:latin typeface="Arial" pitchFamily="34" charset="0"/>
                 <a:cs typeface="Arial" pitchFamily="34" charset="0"/>
               </a:rPr>
-              <a:t>Customer Data Center</a:t>
+              <a:t>Client</a:t>
+            </a:r>
+          </a:p>
+          <a:p>
+            <a:pPr algn="ctr" eaLnBrk="1" hangingPunct="1">
+              <a:spcBef>
+                <a:spcPct val="0"/>
+              </a:spcBef>
+              <a:buFontTx/>
+              <a:buNone/>
+            </a:pPr>
+            <a:r>
+              <a:rPr lang="en-US" altLang="en-US" sz="1100" dirty="0">
+                <a:solidFill>
+                  <a:srgbClr val="000000"/>
+                </a:solidFill>
+                <a:latin typeface="Arial" pitchFamily="34" charset="0"/>
+                <a:cs typeface="Arial" pitchFamily="34" charset="0"/>
+              </a:rPr>
+              <a:t> Data Center</a:t>
             </a:r>
           </a:p>
         </p:txBody>
@@ -56781,7 +56808,11 @@
             </a:pPr>
             <a:r>
               <a:rPr lang="en-US" altLang="en-US" dirty="0"/>
-              <a:t>Can run on many different platforms</a:t>
+              <a:t>Can run on many </a:t>
+            </a:r>
+            <a:r>
+              <a:rPr lang="en-US" altLang="en-US" b="1" dirty="0"/>
+              <a:t>different platforms</a:t>
             </a:r>
           </a:p>
           <a:p>
@@ -56791,7 +56822,15 @@
             </a:pPr>
             <a:r>
               <a:rPr lang="en-US" altLang="en-US" dirty="0"/>
-              <a:t>Processes share OS resources, but remain segregated</a:t>
+              <a:t>Processes </a:t>
+            </a:r>
+            <a:r>
+              <a:rPr lang="en-US" altLang="en-US" b="1" dirty="0"/>
+              <a:t>share</a:t>
+            </a:r>
+            <a:r>
+              <a:rPr lang="en-US" altLang="en-US" dirty="0"/>
+              <a:t> OS resources, but remain segregated</a:t>
             </a:r>
           </a:p>
           <a:p>
@@ -56800,8 +56839,12 @@
               <a:buChar char="•"/>
             </a:pPr>
             <a:r>
+              <a:rPr lang="en-US" altLang="en-US" b="1" dirty="0"/>
+              <a:t>Isolate</a:t>
+            </a:r>
+            <a:r>
               <a:rPr lang="en-US" altLang="en-US" dirty="0"/>
-              <a:t>Isolate the different requirements between the applications that run inside the container, and the operations that run outside the container</a:t>
+              <a:t> the different requirements between the applications that run inside the container, and the operations that run outside the container</a:t>
             </a:r>
           </a:p>
           <a:p>

</xml_diff>